<commit_message>
Edits to the power point presentation
</commit_message>
<xml_diff>
--- a/make_swc_quickstart.pptx
+++ b/make_swc_quickstart.pptx
@@ -294,7 +294,8 @@
           <a:p>
             <a:fld id="{AA29F937-ACB6-334F-A184-2C64CD75571A}" type="datetimeFigureOut">
               <a:rPr lang="en-US" smtClean="0"/>
-              <a:t>8/26/13</a:t>
+              <a:pPr/>
+              <a:t>9/1/2013</a:t>
             </a:fld>
             <a:endParaRPr lang="en-US"/>
           </a:p>
@@ -336,6 +337,7 @@
           <a:p>
             <a:fld id="{36D1645C-AA13-7844-B5B6-05806B0365D9}" type="slidenum">
               <a:rPr lang="en-US" smtClean="0"/>
+              <a:pPr/>
               <a:t>‹#›</a:t>
             </a:fld>
             <a:endParaRPr lang="en-US"/>
@@ -345,7 +347,7 @@
     </p:spTree>
     <p:extLst>
       <p:ext uri="{BB962C8B-B14F-4D97-AF65-F5344CB8AC3E}">
-        <p14:creationId xmlns:p14="http://schemas.microsoft.com/office/powerpoint/2010/main" val="739238082"/>
+        <p14:creationId xmlns:p14="http://schemas.microsoft.com/office/powerpoint/2010/main" xmlns="" val="739238082"/>
       </p:ext>
     </p:extLst>
   </p:cSld>
@@ -464,7 +466,8 @@
           <a:p>
             <a:fld id="{AA29F937-ACB6-334F-A184-2C64CD75571A}" type="datetimeFigureOut">
               <a:rPr lang="en-US" smtClean="0"/>
-              <a:t>8/26/13</a:t>
+              <a:pPr/>
+              <a:t>9/1/2013</a:t>
             </a:fld>
             <a:endParaRPr lang="en-US"/>
           </a:p>
@@ -506,6 +509,7 @@
           <a:p>
             <a:fld id="{36D1645C-AA13-7844-B5B6-05806B0365D9}" type="slidenum">
               <a:rPr lang="en-US" smtClean="0"/>
+              <a:pPr/>
               <a:t>‹#›</a:t>
             </a:fld>
             <a:endParaRPr lang="en-US"/>
@@ -515,7 +519,7 @@
     </p:spTree>
     <p:extLst>
       <p:ext uri="{BB962C8B-B14F-4D97-AF65-F5344CB8AC3E}">
-        <p14:creationId xmlns:p14="http://schemas.microsoft.com/office/powerpoint/2010/main" val="2740903685"/>
+        <p14:creationId xmlns:p14="http://schemas.microsoft.com/office/powerpoint/2010/main" xmlns="" val="2740903685"/>
       </p:ext>
     </p:extLst>
   </p:cSld>
@@ -644,7 +648,8 @@
           <a:p>
             <a:fld id="{AA29F937-ACB6-334F-A184-2C64CD75571A}" type="datetimeFigureOut">
               <a:rPr lang="en-US" smtClean="0"/>
-              <a:t>8/26/13</a:t>
+              <a:pPr/>
+              <a:t>9/1/2013</a:t>
             </a:fld>
             <a:endParaRPr lang="en-US"/>
           </a:p>
@@ -686,6 +691,7 @@
           <a:p>
             <a:fld id="{36D1645C-AA13-7844-B5B6-05806B0365D9}" type="slidenum">
               <a:rPr lang="en-US" smtClean="0"/>
+              <a:pPr/>
               <a:t>‹#›</a:t>
             </a:fld>
             <a:endParaRPr lang="en-US"/>
@@ -695,7 +701,7 @@
     </p:spTree>
     <p:extLst>
       <p:ext uri="{BB962C8B-B14F-4D97-AF65-F5344CB8AC3E}">
-        <p14:creationId xmlns:p14="http://schemas.microsoft.com/office/powerpoint/2010/main" val="3704956030"/>
+        <p14:creationId xmlns:p14="http://schemas.microsoft.com/office/powerpoint/2010/main" xmlns="" val="3704956030"/>
       </p:ext>
     </p:extLst>
   </p:cSld>
@@ -814,7 +820,8 @@
           <a:p>
             <a:fld id="{AA29F937-ACB6-334F-A184-2C64CD75571A}" type="datetimeFigureOut">
               <a:rPr lang="en-US" smtClean="0"/>
-              <a:t>8/26/13</a:t>
+              <a:pPr/>
+              <a:t>9/1/2013</a:t>
             </a:fld>
             <a:endParaRPr lang="en-US"/>
           </a:p>
@@ -856,6 +863,7 @@
           <a:p>
             <a:fld id="{36D1645C-AA13-7844-B5B6-05806B0365D9}" type="slidenum">
               <a:rPr lang="en-US" smtClean="0"/>
+              <a:pPr/>
               <a:t>‹#›</a:t>
             </a:fld>
             <a:endParaRPr lang="en-US"/>
@@ -865,7 +873,7 @@
     </p:spTree>
     <p:extLst>
       <p:ext uri="{BB962C8B-B14F-4D97-AF65-F5344CB8AC3E}">
-        <p14:creationId xmlns:p14="http://schemas.microsoft.com/office/powerpoint/2010/main" val="3031986245"/>
+        <p14:creationId xmlns:p14="http://schemas.microsoft.com/office/powerpoint/2010/main" xmlns="" val="3031986245"/>
       </p:ext>
     </p:extLst>
   </p:cSld>
@@ -1060,7 +1068,8 @@
           <a:p>
             <a:fld id="{AA29F937-ACB6-334F-A184-2C64CD75571A}" type="datetimeFigureOut">
               <a:rPr lang="en-US" smtClean="0"/>
-              <a:t>8/26/13</a:t>
+              <a:pPr/>
+              <a:t>9/1/2013</a:t>
             </a:fld>
             <a:endParaRPr lang="en-US"/>
           </a:p>
@@ -1102,6 +1111,7 @@
           <a:p>
             <a:fld id="{36D1645C-AA13-7844-B5B6-05806B0365D9}" type="slidenum">
               <a:rPr lang="en-US" smtClean="0"/>
+              <a:pPr/>
               <a:t>‹#›</a:t>
             </a:fld>
             <a:endParaRPr lang="en-US"/>
@@ -1111,7 +1121,7 @@
     </p:spTree>
     <p:extLst>
       <p:ext uri="{BB962C8B-B14F-4D97-AF65-F5344CB8AC3E}">
-        <p14:creationId xmlns:p14="http://schemas.microsoft.com/office/powerpoint/2010/main" val="3222178173"/>
+        <p14:creationId xmlns:p14="http://schemas.microsoft.com/office/powerpoint/2010/main" xmlns="" val="3222178173"/>
       </p:ext>
     </p:extLst>
   </p:cSld>
@@ -1348,7 +1358,8 @@
           <a:p>
             <a:fld id="{AA29F937-ACB6-334F-A184-2C64CD75571A}" type="datetimeFigureOut">
               <a:rPr lang="en-US" smtClean="0"/>
-              <a:t>8/26/13</a:t>
+              <a:pPr/>
+              <a:t>9/1/2013</a:t>
             </a:fld>
             <a:endParaRPr lang="en-US"/>
           </a:p>
@@ -1390,6 +1401,7 @@
           <a:p>
             <a:fld id="{36D1645C-AA13-7844-B5B6-05806B0365D9}" type="slidenum">
               <a:rPr lang="en-US" smtClean="0"/>
+              <a:pPr/>
               <a:t>‹#›</a:t>
             </a:fld>
             <a:endParaRPr lang="en-US"/>
@@ -1399,7 +1411,7 @@
     </p:spTree>
     <p:extLst>
       <p:ext uri="{BB962C8B-B14F-4D97-AF65-F5344CB8AC3E}">
-        <p14:creationId xmlns:p14="http://schemas.microsoft.com/office/powerpoint/2010/main" val="2390569979"/>
+        <p14:creationId xmlns:p14="http://schemas.microsoft.com/office/powerpoint/2010/main" xmlns="" val="2390569979"/>
       </p:ext>
     </p:extLst>
   </p:cSld>
@@ -1770,7 +1782,8 @@
           <a:p>
             <a:fld id="{AA29F937-ACB6-334F-A184-2C64CD75571A}" type="datetimeFigureOut">
               <a:rPr lang="en-US" smtClean="0"/>
-              <a:t>8/26/13</a:t>
+              <a:pPr/>
+              <a:t>9/1/2013</a:t>
             </a:fld>
             <a:endParaRPr lang="en-US"/>
           </a:p>
@@ -1812,6 +1825,7 @@
           <a:p>
             <a:fld id="{36D1645C-AA13-7844-B5B6-05806B0365D9}" type="slidenum">
               <a:rPr lang="en-US" smtClean="0"/>
+              <a:pPr/>
               <a:t>‹#›</a:t>
             </a:fld>
             <a:endParaRPr lang="en-US"/>
@@ -1821,7 +1835,7 @@
     </p:spTree>
     <p:extLst>
       <p:ext uri="{BB962C8B-B14F-4D97-AF65-F5344CB8AC3E}">
-        <p14:creationId xmlns:p14="http://schemas.microsoft.com/office/powerpoint/2010/main" val="2292091778"/>
+        <p14:creationId xmlns:p14="http://schemas.microsoft.com/office/powerpoint/2010/main" xmlns="" val="2292091778"/>
       </p:ext>
     </p:extLst>
   </p:cSld>
@@ -1888,7 +1902,8 @@
           <a:p>
             <a:fld id="{AA29F937-ACB6-334F-A184-2C64CD75571A}" type="datetimeFigureOut">
               <a:rPr lang="en-US" smtClean="0"/>
-              <a:t>8/26/13</a:t>
+              <a:pPr/>
+              <a:t>9/1/2013</a:t>
             </a:fld>
             <a:endParaRPr lang="en-US"/>
           </a:p>
@@ -1930,6 +1945,7 @@
           <a:p>
             <a:fld id="{36D1645C-AA13-7844-B5B6-05806B0365D9}" type="slidenum">
               <a:rPr lang="en-US" smtClean="0"/>
+              <a:pPr/>
               <a:t>‹#›</a:t>
             </a:fld>
             <a:endParaRPr lang="en-US"/>
@@ -1939,7 +1955,7 @@
     </p:spTree>
     <p:extLst>
       <p:ext uri="{BB962C8B-B14F-4D97-AF65-F5344CB8AC3E}">
-        <p14:creationId xmlns:p14="http://schemas.microsoft.com/office/powerpoint/2010/main" val="2334389328"/>
+        <p14:creationId xmlns:p14="http://schemas.microsoft.com/office/powerpoint/2010/main" xmlns="" val="2334389328"/>
       </p:ext>
     </p:extLst>
   </p:cSld>
@@ -1983,7 +1999,8 @@
           <a:p>
             <a:fld id="{AA29F937-ACB6-334F-A184-2C64CD75571A}" type="datetimeFigureOut">
               <a:rPr lang="en-US" smtClean="0"/>
-              <a:t>8/26/13</a:t>
+              <a:pPr/>
+              <a:t>9/1/2013</a:t>
             </a:fld>
             <a:endParaRPr lang="en-US"/>
           </a:p>
@@ -2025,6 +2042,7 @@
           <a:p>
             <a:fld id="{36D1645C-AA13-7844-B5B6-05806B0365D9}" type="slidenum">
               <a:rPr lang="en-US" smtClean="0"/>
+              <a:pPr/>
               <a:t>‹#›</a:t>
             </a:fld>
             <a:endParaRPr lang="en-US"/>
@@ -2034,7 +2052,7 @@
     </p:spTree>
     <p:extLst>
       <p:ext uri="{BB962C8B-B14F-4D97-AF65-F5344CB8AC3E}">
-        <p14:creationId xmlns:p14="http://schemas.microsoft.com/office/powerpoint/2010/main" val="1891496928"/>
+        <p14:creationId xmlns:p14="http://schemas.microsoft.com/office/powerpoint/2010/main" xmlns="" val="1891496928"/>
       </p:ext>
     </p:extLst>
   </p:cSld>
@@ -2260,7 +2278,8 @@
           <a:p>
             <a:fld id="{AA29F937-ACB6-334F-A184-2C64CD75571A}" type="datetimeFigureOut">
               <a:rPr lang="en-US" smtClean="0"/>
-              <a:t>8/26/13</a:t>
+              <a:pPr/>
+              <a:t>9/1/2013</a:t>
             </a:fld>
             <a:endParaRPr lang="en-US"/>
           </a:p>
@@ -2302,6 +2321,7 @@
           <a:p>
             <a:fld id="{36D1645C-AA13-7844-B5B6-05806B0365D9}" type="slidenum">
               <a:rPr lang="en-US" smtClean="0"/>
+              <a:pPr/>
               <a:t>‹#›</a:t>
             </a:fld>
             <a:endParaRPr lang="en-US"/>
@@ -2311,7 +2331,7 @@
     </p:spTree>
     <p:extLst>
       <p:ext uri="{BB962C8B-B14F-4D97-AF65-F5344CB8AC3E}">
-        <p14:creationId xmlns:p14="http://schemas.microsoft.com/office/powerpoint/2010/main" val="1493538828"/>
+        <p14:creationId xmlns:p14="http://schemas.microsoft.com/office/powerpoint/2010/main" xmlns="" val="1493538828"/>
       </p:ext>
     </p:extLst>
   </p:cSld>
@@ -2513,7 +2533,8 @@
           <a:p>
             <a:fld id="{AA29F937-ACB6-334F-A184-2C64CD75571A}" type="datetimeFigureOut">
               <a:rPr lang="en-US" smtClean="0"/>
-              <a:t>8/26/13</a:t>
+              <a:pPr/>
+              <a:t>9/1/2013</a:t>
             </a:fld>
             <a:endParaRPr lang="en-US"/>
           </a:p>
@@ -2555,6 +2576,7 @@
           <a:p>
             <a:fld id="{36D1645C-AA13-7844-B5B6-05806B0365D9}" type="slidenum">
               <a:rPr lang="en-US" smtClean="0"/>
+              <a:pPr/>
               <a:t>‹#›</a:t>
             </a:fld>
             <a:endParaRPr lang="en-US"/>
@@ -2564,7 +2586,7 @@
     </p:spTree>
     <p:extLst>
       <p:ext uri="{BB962C8B-B14F-4D97-AF65-F5344CB8AC3E}">
-        <p14:creationId xmlns:p14="http://schemas.microsoft.com/office/powerpoint/2010/main" val="2463597135"/>
+        <p14:creationId xmlns:p14="http://schemas.microsoft.com/office/powerpoint/2010/main" xmlns="" val="2463597135"/>
       </p:ext>
     </p:extLst>
   </p:cSld>
@@ -2726,7 +2748,8 @@
           <a:p>
             <a:fld id="{AA29F937-ACB6-334F-A184-2C64CD75571A}" type="datetimeFigureOut">
               <a:rPr lang="en-US" smtClean="0"/>
-              <a:t>8/26/13</a:t>
+              <a:pPr/>
+              <a:t>9/1/2013</a:t>
             </a:fld>
             <a:endParaRPr lang="en-US"/>
           </a:p>
@@ -2804,6 +2827,7 @@
           <a:p>
             <a:fld id="{36D1645C-AA13-7844-B5B6-05806B0365D9}" type="slidenum">
               <a:rPr lang="en-US" smtClean="0"/>
+              <a:pPr/>
               <a:t>‹#›</a:t>
             </a:fld>
             <a:endParaRPr lang="en-US"/>
@@ -2813,7 +2837,7 @@
     </p:spTree>
     <p:extLst>
       <p:ext uri="{BB962C8B-B14F-4D97-AF65-F5344CB8AC3E}">
-        <p14:creationId xmlns:p14="http://schemas.microsoft.com/office/powerpoint/2010/main" val="92069919"/>
+        <p14:creationId xmlns:p14="http://schemas.microsoft.com/office/powerpoint/2010/main" xmlns="" val="92069919"/>
       </p:ext>
     </p:extLst>
   </p:cSld>
@@ -3118,7 +3142,7 @@
           <a:p>
             <a:r>
               <a:rPr lang="en-US" dirty="0" smtClean="0"/>
-              <a:t>Using Make For Reproducibility</a:t>
+              <a:t>Make &amp; Reproducible Analyses</a:t>
             </a:r>
             <a:endParaRPr lang="en-US" dirty="0"/>
           </a:p>
@@ -3176,7 +3200,7 @@
     </p:spTree>
     <p:extLst>
       <p:ext uri="{BB962C8B-B14F-4D97-AF65-F5344CB8AC3E}">
-        <p14:creationId xmlns:p14="http://schemas.microsoft.com/office/powerpoint/2010/main" val="1084336545"/>
+        <p14:creationId xmlns:p14="http://schemas.microsoft.com/office/powerpoint/2010/main" xmlns="" val="1084336545"/>
       </p:ext>
     </p:extLst>
   </p:cSld>
@@ -3186,7 +3210,7 @@
   <p:timing>
     <p:tnLst>
       <p:par>
-        <p:cTn xmlns:p14="http://schemas.microsoft.com/office/powerpoint/2010/main" id="1" dur="indefinite" restart="never" nodeType="tmRoot"/>
+        <p:cTn id="1" dur="indefinite" restart="never" nodeType="tmRoot"/>
       </p:par>
     </p:tnLst>
   </p:timing>
@@ -3255,12 +3279,16 @@
           </a:p>
           <a:p>
             <a:r>
-              <a:rPr lang="en-US" smtClean="0"/>
-              <a:t>Designed </a:t>
-            </a:r>
-            <a:r>
-              <a:rPr lang="en-US" dirty="0" smtClean="0"/>
-              <a:t>around ‘recipes’ defining</a:t>
+              <a:rPr lang="en-US" dirty="0" smtClean="0"/>
+              <a:t>Designed around </a:t>
+            </a:r>
+            <a:r>
+              <a:rPr lang="en-US" dirty="0" smtClean="0"/>
+              <a:t>‘recipes’ </a:t>
+            </a:r>
+            <a:r>
+              <a:rPr lang="en-US" dirty="0" smtClean="0"/>
+              <a:t>defining</a:t>
             </a:r>
           </a:p>
           <a:p>
@@ -3287,13 +3315,22 @@
           <a:p>
             <a:r>
               <a:rPr lang="en-US" dirty="0" smtClean="0"/>
-              <a:t>Rebuilds targets only when dependencies are updated</a:t>
-            </a:r>
-          </a:p>
-          <a:p>
-            <a:r>
-              <a:rPr lang="en-US" dirty="0" smtClean="0"/>
-              <a:t>Very mature</a:t>
+              <a:t>Rebuilds targets only </a:t>
+            </a:r>
+            <a:r>
+              <a:rPr lang="en-US" dirty="0" smtClean="0"/>
+              <a:t>when required</a:t>
+            </a:r>
+            <a:endParaRPr lang="en-US" dirty="0" smtClean="0"/>
+          </a:p>
+          <a:p>
+            <a:r>
+              <a:rPr lang="en-US" dirty="0" smtClean="0"/>
+              <a:t>Very </a:t>
+            </a:r>
+            <a:r>
+              <a:rPr lang="en-US" dirty="0" smtClean="0"/>
+              <a:t>stable and mature</a:t>
             </a:r>
             <a:endParaRPr lang="en-US" dirty="0"/>
           </a:p>
@@ -3302,7 +3339,7 @@
     </p:spTree>
     <p:extLst>
       <p:ext uri="{BB962C8B-B14F-4D97-AF65-F5344CB8AC3E}">
-        <p14:creationId xmlns:p14="http://schemas.microsoft.com/office/powerpoint/2010/main" val="3683493359"/>
+        <p14:creationId xmlns:p14="http://schemas.microsoft.com/office/powerpoint/2010/main" xmlns="" val="3683493359"/>
       </p:ext>
     </p:extLst>
   </p:cSld>
@@ -3430,7 +3467,7 @@
     </p:spTree>
     <p:extLst>
       <p:ext uri="{BB962C8B-B14F-4D97-AF65-F5344CB8AC3E}">
-        <p14:creationId xmlns:p14="http://schemas.microsoft.com/office/powerpoint/2010/main" val="491944262"/>
+        <p14:creationId xmlns:p14="http://schemas.microsoft.com/office/powerpoint/2010/main" xmlns="" val="491944262"/>
       </p:ext>
     </p:extLst>
   </p:cSld>
@@ -3944,7 +3981,7 @@
     </p:spTree>
     <p:extLst>
       <p:ext uri="{BB962C8B-B14F-4D97-AF65-F5344CB8AC3E}">
-        <p14:creationId xmlns:p14="http://schemas.microsoft.com/office/powerpoint/2010/main" val="2609321141"/>
+        <p14:creationId xmlns:p14="http://schemas.microsoft.com/office/powerpoint/2010/main" xmlns="" val="2609321141"/>
       </p:ext>
     </p:extLst>
   </p:cSld>
@@ -3988,7 +4025,7 @@
           <a:p>
             <a:r>
               <a:rPr lang="en-US" dirty="0" smtClean="0"/>
-              <a:t>Why Use Make?</a:t>
+              <a:t>Make for Analysis Pipelines</a:t>
             </a:r>
             <a:endParaRPr lang="en-US" dirty="0"/>
           </a:p>
@@ -4065,7 +4102,7 @@
     </p:spTree>
     <p:extLst>
       <p:ext uri="{BB962C8B-B14F-4D97-AF65-F5344CB8AC3E}">
-        <p14:creationId xmlns:p14="http://schemas.microsoft.com/office/powerpoint/2010/main" val="971951723"/>
+        <p14:creationId xmlns:p14="http://schemas.microsoft.com/office/powerpoint/2010/main" xmlns="" val="971951723"/>
       </p:ext>
     </p:extLst>
   </p:cSld>
@@ -4184,7 +4221,7 @@
     </p:spTree>
     <p:extLst>
       <p:ext uri="{BB962C8B-B14F-4D97-AF65-F5344CB8AC3E}">
-        <p14:creationId xmlns:p14="http://schemas.microsoft.com/office/powerpoint/2010/main" val="4193112732"/>
+        <p14:creationId xmlns:p14="http://schemas.microsoft.com/office/powerpoint/2010/main" xmlns="" val="4193112732"/>
       </p:ext>
     </p:extLst>
   </p:cSld>
@@ -4237,7 +4274,7 @@
     </p:spTree>
     <p:extLst>
       <p:ext uri="{BB962C8B-B14F-4D97-AF65-F5344CB8AC3E}">
-        <p14:creationId xmlns:p14="http://schemas.microsoft.com/office/powerpoint/2010/main" val="1551060267"/>
+        <p14:creationId xmlns:p14="http://schemas.microsoft.com/office/powerpoint/2010/main" xmlns="" val="1551060267"/>
       </p:ext>
     </p:extLst>
   </p:cSld>

</xml_diff>

<commit_message>
Added example Makefile from powerpoint, small edits to the power point, added multiple choice question
</commit_message>
<xml_diff>
--- a/make_swc_quickstart.pptx
+++ b/make_swc_quickstart.pptx
@@ -295,7 +295,7 @@
             <a:fld id="{AA29F937-ACB6-334F-A184-2C64CD75571A}" type="datetimeFigureOut">
               <a:rPr lang="en-US" smtClean="0"/>
               <a:pPr/>
-              <a:t>9/1/2013</a:t>
+              <a:t>9/2/2013</a:t>
             </a:fld>
             <a:endParaRPr lang="en-US"/>
           </a:p>
@@ -347,7 +347,7 @@
     </p:spTree>
     <p:extLst>
       <p:ext uri="{BB962C8B-B14F-4D97-AF65-F5344CB8AC3E}">
-        <p14:creationId xmlns:p14="http://schemas.microsoft.com/office/powerpoint/2010/main" xmlns="" val="739238082"/>
+        <p14:creationId xmlns="" xmlns:p14="http://schemas.microsoft.com/office/powerpoint/2010/main" val="739238082"/>
       </p:ext>
     </p:extLst>
   </p:cSld>
@@ -467,7 +467,7 @@
             <a:fld id="{AA29F937-ACB6-334F-A184-2C64CD75571A}" type="datetimeFigureOut">
               <a:rPr lang="en-US" smtClean="0"/>
               <a:pPr/>
-              <a:t>9/1/2013</a:t>
+              <a:t>9/2/2013</a:t>
             </a:fld>
             <a:endParaRPr lang="en-US"/>
           </a:p>
@@ -519,7 +519,7 @@
     </p:spTree>
     <p:extLst>
       <p:ext uri="{BB962C8B-B14F-4D97-AF65-F5344CB8AC3E}">
-        <p14:creationId xmlns:p14="http://schemas.microsoft.com/office/powerpoint/2010/main" xmlns="" val="2740903685"/>
+        <p14:creationId xmlns="" xmlns:p14="http://schemas.microsoft.com/office/powerpoint/2010/main" val="2740903685"/>
       </p:ext>
     </p:extLst>
   </p:cSld>
@@ -649,7 +649,7 @@
             <a:fld id="{AA29F937-ACB6-334F-A184-2C64CD75571A}" type="datetimeFigureOut">
               <a:rPr lang="en-US" smtClean="0"/>
               <a:pPr/>
-              <a:t>9/1/2013</a:t>
+              <a:t>9/2/2013</a:t>
             </a:fld>
             <a:endParaRPr lang="en-US"/>
           </a:p>
@@ -701,7 +701,7 @@
     </p:spTree>
     <p:extLst>
       <p:ext uri="{BB962C8B-B14F-4D97-AF65-F5344CB8AC3E}">
-        <p14:creationId xmlns:p14="http://schemas.microsoft.com/office/powerpoint/2010/main" xmlns="" val="3704956030"/>
+        <p14:creationId xmlns="" xmlns:p14="http://schemas.microsoft.com/office/powerpoint/2010/main" val="3704956030"/>
       </p:ext>
     </p:extLst>
   </p:cSld>
@@ -821,7 +821,7 @@
             <a:fld id="{AA29F937-ACB6-334F-A184-2C64CD75571A}" type="datetimeFigureOut">
               <a:rPr lang="en-US" smtClean="0"/>
               <a:pPr/>
-              <a:t>9/1/2013</a:t>
+              <a:t>9/2/2013</a:t>
             </a:fld>
             <a:endParaRPr lang="en-US"/>
           </a:p>
@@ -873,7 +873,7 @@
     </p:spTree>
     <p:extLst>
       <p:ext uri="{BB962C8B-B14F-4D97-AF65-F5344CB8AC3E}">
-        <p14:creationId xmlns:p14="http://schemas.microsoft.com/office/powerpoint/2010/main" xmlns="" val="3031986245"/>
+        <p14:creationId xmlns="" xmlns:p14="http://schemas.microsoft.com/office/powerpoint/2010/main" val="3031986245"/>
       </p:ext>
     </p:extLst>
   </p:cSld>
@@ -1069,7 +1069,7 @@
             <a:fld id="{AA29F937-ACB6-334F-A184-2C64CD75571A}" type="datetimeFigureOut">
               <a:rPr lang="en-US" smtClean="0"/>
               <a:pPr/>
-              <a:t>9/1/2013</a:t>
+              <a:t>9/2/2013</a:t>
             </a:fld>
             <a:endParaRPr lang="en-US"/>
           </a:p>
@@ -1121,7 +1121,7 @@
     </p:spTree>
     <p:extLst>
       <p:ext uri="{BB962C8B-B14F-4D97-AF65-F5344CB8AC3E}">
-        <p14:creationId xmlns:p14="http://schemas.microsoft.com/office/powerpoint/2010/main" xmlns="" val="3222178173"/>
+        <p14:creationId xmlns="" xmlns:p14="http://schemas.microsoft.com/office/powerpoint/2010/main" val="3222178173"/>
       </p:ext>
     </p:extLst>
   </p:cSld>
@@ -1359,7 +1359,7 @@
             <a:fld id="{AA29F937-ACB6-334F-A184-2C64CD75571A}" type="datetimeFigureOut">
               <a:rPr lang="en-US" smtClean="0"/>
               <a:pPr/>
-              <a:t>9/1/2013</a:t>
+              <a:t>9/2/2013</a:t>
             </a:fld>
             <a:endParaRPr lang="en-US"/>
           </a:p>
@@ -1411,7 +1411,7 @@
     </p:spTree>
     <p:extLst>
       <p:ext uri="{BB962C8B-B14F-4D97-AF65-F5344CB8AC3E}">
-        <p14:creationId xmlns:p14="http://schemas.microsoft.com/office/powerpoint/2010/main" xmlns="" val="2390569979"/>
+        <p14:creationId xmlns="" xmlns:p14="http://schemas.microsoft.com/office/powerpoint/2010/main" val="2390569979"/>
       </p:ext>
     </p:extLst>
   </p:cSld>
@@ -1783,7 +1783,7 @@
             <a:fld id="{AA29F937-ACB6-334F-A184-2C64CD75571A}" type="datetimeFigureOut">
               <a:rPr lang="en-US" smtClean="0"/>
               <a:pPr/>
-              <a:t>9/1/2013</a:t>
+              <a:t>9/2/2013</a:t>
             </a:fld>
             <a:endParaRPr lang="en-US"/>
           </a:p>
@@ -1835,7 +1835,7 @@
     </p:spTree>
     <p:extLst>
       <p:ext uri="{BB962C8B-B14F-4D97-AF65-F5344CB8AC3E}">
-        <p14:creationId xmlns:p14="http://schemas.microsoft.com/office/powerpoint/2010/main" xmlns="" val="2292091778"/>
+        <p14:creationId xmlns="" xmlns:p14="http://schemas.microsoft.com/office/powerpoint/2010/main" val="2292091778"/>
       </p:ext>
     </p:extLst>
   </p:cSld>
@@ -1903,7 +1903,7 @@
             <a:fld id="{AA29F937-ACB6-334F-A184-2C64CD75571A}" type="datetimeFigureOut">
               <a:rPr lang="en-US" smtClean="0"/>
               <a:pPr/>
-              <a:t>9/1/2013</a:t>
+              <a:t>9/2/2013</a:t>
             </a:fld>
             <a:endParaRPr lang="en-US"/>
           </a:p>
@@ -1955,7 +1955,7 @@
     </p:spTree>
     <p:extLst>
       <p:ext uri="{BB962C8B-B14F-4D97-AF65-F5344CB8AC3E}">
-        <p14:creationId xmlns:p14="http://schemas.microsoft.com/office/powerpoint/2010/main" xmlns="" val="2334389328"/>
+        <p14:creationId xmlns="" xmlns:p14="http://schemas.microsoft.com/office/powerpoint/2010/main" val="2334389328"/>
       </p:ext>
     </p:extLst>
   </p:cSld>
@@ -2000,7 +2000,7 @@
             <a:fld id="{AA29F937-ACB6-334F-A184-2C64CD75571A}" type="datetimeFigureOut">
               <a:rPr lang="en-US" smtClean="0"/>
               <a:pPr/>
-              <a:t>9/1/2013</a:t>
+              <a:t>9/2/2013</a:t>
             </a:fld>
             <a:endParaRPr lang="en-US"/>
           </a:p>
@@ -2052,7 +2052,7 @@
     </p:spTree>
     <p:extLst>
       <p:ext uri="{BB962C8B-B14F-4D97-AF65-F5344CB8AC3E}">
-        <p14:creationId xmlns:p14="http://schemas.microsoft.com/office/powerpoint/2010/main" xmlns="" val="1891496928"/>
+        <p14:creationId xmlns="" xmlns:p14="http://schemas.microsoft.com/office/powerpoint/2010/main" val="1891496928"/>
       </p:ext>
     </p:extLst>
   </p:cSld>
@@ -2279,7 +2279,7 @@
             <a:fld id="{AA29F937-ACB6-334F-A184-2C64CD75571A}" type="datetimeFigureOut">
               <a:rPr lang="en-US" smtClean="0"/>
               <a:pPr/>
-              <a:t>9/1/2013</a:t>
+              <a:t>9/2/2013</a:t>
             </a:fld>
             <a:endParaRPr lang="en-US"/>
           </a:p>
@@ -2331,7 +2331,7 @@
     </p:spTree>
     <p:extLst>
       <p:ext uri="{BB962C8B-B14F-4D97-AF65-F5344CB8AC3E}">
-        <p14:creationId xmlns:p14="http://schemas.microsoft.com/office/powerpoint/2010/main" xmlns="" val="1493538828"/>
+        <p14:creationId xmlns="" xmlns:p14="http://schemas.microsoft.com/office/powerpoint/2010/main" val="1493538828"/>
       </p:ext>
     </p:extLst>
   </p:cSld>
@@ -2534,7 +2534,7 @@
             <a:fld id="{AA29F937-ACB6-334F-A184-2C64CD75571A}" type="datetimeFigureOut">
               <a:rPr lang="en-US" smtClean="0"/>
               <a:pPr/>
-              <a:t>9/1/2013</a:t>
+              <a:t>9/2/2013</a:t>
             </a:fld>
             <a:endParaRPr lang="en-US"/>
           </a:p>
@@ -2586,7 +2586,7 @@
     </p:spTree>
     <p:extLst>
       <p:ext uri="{BB962C8B-B14F-4D97-AF65-F5344CB8AC3E}">
-        <p14:creationId xmlns:p14="http://schemas.microsoft.com/office/powerpoint/2010/main" xmlns="" val="2463597135"/>
+        <p14:creationId xmlns="" xmlns:p14="http://schemas.microsoft.com/office/powerpoint/2010/main" val="2463597135"/>
       </p:ext>
     </p:extLst>
   </p:cSld>
@@ -2749,7 +2749,7 @@
             <a:fld id="{AA29F937-ACB6-334F-A184-2C64CD75571A}" type="datetimeFigureOut">
               <a:rPr lang="en-US" smtClean="0"/>
               <a:pPr/>
-              <a:t>9/1/2013</a:t>
+              <a:t>9/2/2013</a:t>
             </a:fld>
             <a:endParaRPr lang="en-US"/>
           </a:p>
@@ -2837,7 +2837,7 @@
     </p:spTree>
     <p:extLst>
       <p:ext uri="{BB962C8B-B14F-4D97-AF65-F5344CB8AC3E}">
-        <p14:creationId xmlns:p14="http://schemas.microsoft.com/office/powerpoint/2010/main" xmlns="" val="92069919"/>
+        <p14:creationId xmlns="" xmlns:p14="http://schemas.microsoft.com/office/powerpoint/2010/main" val="92069919"/>
       </p:ext>
     </p:extLst>
   </p:cSld>
@@ -3200,7 +3200,7 @@
     </p:spTree>
     <p:extLst>
       <p:ext uri="{BB962C8B-B14F-4D97-AF65-F5344CB8AC3E}">
-        <p14:creationId xmlns:p14="http://schemas.microsoft.com/office/powerpoint/2010/main" xmlns="" val="1084336545"/>
+        <p14:creationId xmlns="" xmlns:p14="http://schemas.microsoft.com/office/powerpoint/2010/main" val="1084336545"/>
       </p:ext>
     </p:extLst>
   </p:cSld>
@@ -3280,15 +3280,7 @@
           <a:p>
             <a:r>
               <a:rPr lang="en-US" dirty="0" smtClean="0"/>
-              <a:t>Designed around </a:t>
-            </a:r>
-            <a:r>
-              <a:rPr lang="en-US" dirty="0" smtClean="0"/>
-              <a:t>‘recipes’ </a:t>
-            </a:r>
-            <a:r>
-              <a:rPr lang="en-US" dirty="0" smtClean="0"/>
-              <a:t>defining</a:t>
+              <a:t>Designed around ‘recipes’ defining</a:t>
             </a:r>
           </a:p>
           <a:p>
@@ -3315,22 +3307,13 @@
           <a:p>
             <a:r>
               <a:rPr lang="en-US" dirty="0" smtClean="0"/>
-              <a:t>Rebuilds targets only </a:t>
-            </a:r>
-            <a:r>
-              <a:rPr lang="en-US" dirty="0" smtClean="0"/>
-              <a:t>when required</a:t>
-            </a:r>
-            <a:endParaRPr lang="en-US" dirty="0" smtClean="0"/>
-          </a:p>
-          <a:p>
-            <a:r>
-              <a:rPr lang="en-US" dirty="0" smtClean="0"/>
-              <a:t>Very </a:t>
-            </a:r>
-            <a:r>
-              <a:rPr lang="en-US" dirty="0" smtClean="0"/>
-              <a:t>stable and mature</a:t>
+              <a:t>Rebuilds targets only when required</a:t>
+            </a:r>
+          </a:p>
+          <a:p>
+            <a:r>
+              <a:rPr lang="en-US" dirty="0" smtClean="0"/>
+              <a:t>Very stable and mature</a:t>
             </a:r>
             <a:endParaRPr lang="en-US" dirty="0"/>
           </a:p>
@@ -3339,7 +3322,7 @@
     </p:spTree>
     <p:extLst>
       <p:ext uri="{BB962C8B-B14F-4D97-AF65-F5344CB8AC3E}">
-        <p14:creationId xmlns:p14="http://schemas.microsoft.com/office/powerpoint/2010/main" xmlns="" val="3683493359"/>
+        <p14:creationId xmlns="" xmlns:p14="http://schemas.microsoft.com/office/powerpoint/2010/main" val="3683493359"/>
       </p:ext>
     </p:extLst>
   </p:cSld>
@@ -3467,7 +3450,7 @@
     </p:spTree>
     <p:extLst>
       <p:ext uri="{BB962C8B-B14F-4D97-AF65-F5344CB8AC3E}">
-        <p14:creationId xmlns:p14="http://schemas.microsoft.com/office/powerpoint/2010/main" xmlns="" val="491944262"/>
+        <p14:creationId xmlns="" xmlns:p14="http://schemas.microsoft.com/office/powerpoint/2010/main" val="491944262"/>
       </p:ext>
     </p:extLst>
   </p:cSld>
@@ -3981,7 +3964,7 @@
     </p:spTree>
     <p:extLst>
       <p:ext uri="{BB962C8B-B14F-4D97-AF65-F5344CB8AC3E}">
-        <p14:creationId xmlns:p14="http://schemas.microsoft.com/office/powerpoint/2010/main" xmlns="" val="2609321141"/>
+        <p14:creationId xmlns="" xmlns:p14="http://schemas.microsoft.com/office/powerpoint/2010/main" val="2609321141"/>
       </p:ext>
     </p:extLst>
   </p:cSld>
@@ -4102,7 +4085,7 @@
     </p:spTree>
     <p:extLst>
       <p:ext uri="{BB962C8B-B14F-4D97-AF65-F5344CB8AC3E}">
-        <p14:creationId xmlns:p14="http://schemas.microsoft.com/office/powerpoint/2010/main" xmlns="" val="971951723"/>
+        <p14:creationId xmlns="" xmlns:p14="http://schemas.microsoft.com/office/powerpoint/2010/main" val="971951723"/>
       </p:ext>
     </p:extLst>
   </p:cSld>
@@ -4221,7 +4204,7 @@
     </p:spTree>
     <p:extLst>
       <p:ext uri="{BB962C8B-B14F-4D97-AF65-F5344CB8AC3E}">
-        <p14:creationId xmlns:p14="http://schemas.microsoft.com/office/powerpoint/2010/main" xmlns="" val="4193112732"/>
+        <p14:creationId xmlns="" xmlns:p14="http://schemas.microsoft.com/office/powerpoint/2010/main" val="4193112732"/>
       </p:ext>
     </p:extLst>
   </p:cSld>
@@ -4274,7 +4257,7 @@
     </p:spTree>
     <p:extLst>
       <p:ext uri="{BB962C8B-B14F-4D97-AF65-F5344CB8AC3E}">
-        <p14:creationId xmlns:p14="http://schemas.microsoft.com/office/powerpoint/2010/main" xmlns="" val="1551060267"/>
+        <p14:creationId xmlns="" xmlns:p14="http://schemas.microsoft.com/office/powerpoint/2010/main" val="1551060267"/>
       </p:ext>
     </p:extLst>
   </p:cSld>

</xml_diff>

<commit_message>
Added a second question and fixed the link in the power point presentation
</commit_message>
<xml_diff>
--- a/make_swc_quickstart.pptx
+++ b/make_swc_quickstart.pptx
@@ -295,7 +295,7 @@
             <a:fld id="{AA29F937-ACB6-334F-A184-2C64CD75571A}" type="datetimeFigureOut">
               <a:rPr lang="en-US" smtClean="0"/>
               <a:pPr/>
-              <a:t>9/2/2013</a:t>
+              <a:t>9/4/2013</a:t>
             </a:fld>
             <a:endParaRPr lang="en-US"/>
           </a:p>
@@ -347,7 +347,7 @@
     </p:spTree>
     <p:extLst>
       <p:ext uri="{BB962C8B-B14F-4D97-AF65-F5344CB8AC3E}">
-        <p14:creationId xmlns="" xmlns:p14="http://schemas.microsoft.com/office/powerpoint/2010/main" val="739238082"/>
+        <p14:creationId xmlns:p14="http://schemas.microsoft.com/office/powerpoint/2010/main" xmlns="" val="739238082"/>
       </p:ext>
     </p:extLst>
   </p:cSld>
@@ -467,7 +467,7 @@
             <a:fld id="{AA29F937-ACB6-334F-A184-2C64CD75571A}" type="datetimeFigureOut">
               <a:rPr lang="en-US" smtClean="0"/>
               <a:pPr/>
-              <a:t>9/2/2013</a:t>
+              <a:t>9/4/2013</a:t>
             </a:fld>
             <a:endParaRPr lang="en-US"/>
           </a:p>
@@ -519,7 +519,7 @@
     </p:spTree>
     <p:extLst>
       <p:ext uri="{BB962C8B-B14F-4D97-AF65-F5344CB8AC3E}">
-        <p14:creationId xmlns="" xmlns:p14="http://schemas.microsoft.com/office/powerpoint/2010/main" val="2740903685"/>
+        <p14:creationId xmlns:p14="http://schemas.microsoft.com/office/powerpoint/2010/main" xmlns="" val="2740903685"/>
       </p:ext>
     </p:extLst>
   </p:cSld>
@@ -649,7 +649,7 @@
             <a:fld id="{AA29F937-ACB6-334F-A184-2C64CD75571A}" type="datetimeFigureOut">
               <a:rPr lang="en-US" smtClean="0"/>
               <a:pPr/>
-              <a:t>9/2/2013</a:t>
+              <a:t>9/4/2013</a:t>
             </a:fld>
             <a:endParaRPr lang="en-US"/>
           </a:p>
@@ -701,7 +701,7 @@
     </p:spTree>
     <p:extLst>
       <p:ext uri="{BB962C8B-B14F-4D97-AF65-F5344CB8AC3E}">
-        <p14:creationId xmlns="" xmlns:p14="http://schemas.microsoft.com/office/powerpoint/2010/main" val="3704956030"/>
+        <p14:creationId xmlns:p14="http://schemas.microsoft.com/office/powerpoint/2010/main" xmlns="" val="3704956030"/>
       </p:ext>
     </p:extLst>
   </p:cSld>
@@ -821,7 +821,7 @@
             <a:fld id="{AA29F937-ACB6-334F-A184-2C64CD75571A}" type="datetimeFigureOut">
               <a:rPr lang="en-US" smtClean="0"/>
               <a:pPr/>
-              <a:t>9/2/2013</a:t>
+              <a:t>9/4/2013</a:t>
             </a:fld>
             <a:endParaRPr lang="en-US"/>
           </a:p>
@@ -873,7 +873,7 @@
     </p:spTree>
     <p:extLst>
       <p:ext uri="{BB962C8B-B14F-4D97-AF65-F5344CB8AC3E}">
-        <p14:creationId xmlns="" xmlns:p14="http://schemas.microsoft.com/office/powerpoint/2010/main" val="3031986245"/>
+        <p14:creationId xmlns:p14="http://schemas.microsoft.com/office/powerpoint/2010/main" xmlns="" val="3031986245"/>
       </p:ext>
     </p:extLst>
   </p:cSld>
@@ -1069,7 +1069,7 @@
             <a:fld id="{AA29F937-ACB6-334F-A184-2C64CD75571A}" type="datetimeFigureOut">
               <a:rPr lang="en-US" smtClean="0"/>
               <a:pPr/>
-              <a:t>9/2/2013</a:t>
+              <a:t>9/4/2013</a:t>
             </a:fld>
             <a:endParaRPr lang="en-US"/>
           </a:p>
@@ -1121,7 +1121,7 @@
     </p:spTree>
     <p:extLst>
       <p:ext uri="{BB962C8B-B14F-4D97-AF65-F5344CB8AC3E}">
-        <p14:creationId xmlns="" xmlns:p14="http://schemas.microsoft.com/office/powerpoint/2010/main" val="3222178173"/>
+        <p14:creationId xmlns:p14="http://schemas.microsoft.com/office/powerpoint/2010/main" xmlns="" val="3222178173"/>
       </p:ext>
     </p:extLst>
   </p:cSld>
@@ -1359,7 +1359,7 @@
             <a:fld id="{AA29F937-ACB6-334F-A184-2C64CD75571A}" type="datetimeFigureOut">
               <a:rPr lang="en-US" smtClean="0"/>
               <a:pPr/>
-              <a:t>9/2/2013</a:t>
+              <a:t>9/4/2013</a:t>
             </a:fld>
             <a:endParaRPr lang="en-US"/>
           </a:p>
@@ -1411,7 +1411,7 @@
     </p:spTree>
     <p:extLst>
       <p:ext uri="{BB962C8B-B14F-4D97-AF65-F5344CB8AC3E}">
-        <p14:creationId xmlns="" xmlns:p14="http://schemas.microsoft.com/office/powerpoint/2010/main" val="2390569979"/>
+        <p14:creationId xmlns:p14="http://schemas.microsoft.com/office/powerpoint/2010/main" xmlns="" val="2390569979"/>
       </p:ext>
     </p:extLst>
   </p:cSld>
@@ -1783,7 +1783,7 @@
             <a:fld id="{AA29F937-ACB6-334F-A184-2C64CD75571A}" type="datetimeFigureOut">
               <a:rPr lang="en-US" smtClean="0"/>
               <a:pPr/>
-              <a:t>9/2/2013</a:t>
+              <a:t>9/4/2013</a:t>
             </a:fld>
             <a:endParaRPr lang="en-US"/>
           </a:p>
@@ -1835,7 +1835,7 @@
     </p:spTree>
     <p:extLst>
       <p:ext uri="{BB962C8B-B14F-4D97-AF65-F5344CB8AC3E}">
-        <p14:creationId xmlns="" xmlns:p14="http://schemas.microsoft.com/office/powerpoint/2010/main" val="2292091778"/>
+        <p14:creationId xmlns:p14="http://schemas.microsoft.com/office/powerpoint/2010/main" xmlns="" val="2292091778"/>
       </p:ext>
     </p:extLst>
   </p:cSld>
@@ -1903,7 +1903,7 @@
             <a:fld id="{AA29F937-ACB6-334F-A184-2C64CD75571A}" type="datetimeFigureOut">
               <a:rPr lang="en-US" smtClean="0"/>
               <a:pPr/>
-              <a:t>9/2/2013</a:t>
+              <a:t>9/4/2013</a:t>
             </a:fld>
             <a:endParaRPr lang="en-US"/>
           </a:p>
@@ -1955,7 +1955,7 @@
     </p:spTree>
     <p:extLst>
       <p:ext uri="{BB962C8B-B14F-4D97-AF65-F5344CB8AC3E}">
-        <p14:creationId xmlns="" xmlns:p14="http://schemas.microsoft.com/office/powerpoint/2010/main" val="2334389328"/>
+        <p14:creationId xmlns:p14="http://schemas.microsoft.com/office/powerpoint/2010/main" xmlns="" val="2334389328"/>
       </p:ext>
     </p:extLst>
   </p:cSld>
@@ -2000,7 +2000,7 @@
             <a:fld id="{AA29F937-ACB6-334F-A184-2C64CD75571A}" type="datetimeFigureOut">
               <a:rPr lang="en-US" smtClean="0"/>
               <a:pPr/>
-              <a:t>9/2/2013</a:t>
+              <a:t>9/4/2013</a:t>
             </a:fld>
             <a:endParaRPr lang="en-US"/>
           </a:p>
@@ -2052,7 +2052,7 @@
     </p:spTree>
     <p:extLst>
       <p:ext uri="{BB962C8B-B14F-4D97-AF65-F5344CB8AC3E}">
-        <p14:creationId xmlns="" xmlns:p14="http://schemas.microsoft.com/office/powerpoint/2010/main" val="1891496928"/>
+        <p14:creationId xmlns:p14="http://schemas.microsoft.com/office/powerpoint/2010/main" xmlns="" val="1891496928"/>
       </p:ext>
     </p:extLst>
   </p:cSld>
@@ -2279,7 +2279,7 @@
             <a:fld id="{AA29F937-ACB6-334F-A184-2C64CD75571A}" type="datetimeFigureOut">
               <a:rPr lang="en-US" smtClean="0"/>
               <a:pPr/>
-              <a:t>9/2/2013</a:t>
+              <a:t>9/4/2013</a:t>
             </a:fld>
             <a:endParaRPr lang="en-US"/>
           </a:p>
@@ -2331,7 +2331,7 @@
     </p:spTree>
     <p:extLst>
       <p:ext uri="{BB962C8B-B14F-4D97-AF65-F5344CB8AC3E}">
-        <p14:creationId xmlns="" xmlns:p14="http://schemas.microsoft.com/office/powerpoint/2010/main" val="1493538828"/>
+        <p14:creationId xmlns:p14="http://schemas.microsoft.com/office/powerpoint/2010/main" xmlns="" val="1493538828"/>
       </p:ext>
     </p:extLst>
   </p:cSld>
@@ -2534,7 +2534,7 @@
             <a:fld id="{AA29F937-ACB6-334F-A184-2C64CD75571A}" type="datetimeFigureOut">
               <a:rPr lang="en-US" smtClean="0"/>
               <a:pPr/>
-              <a:t>9/2/2013</a:t>
+              <a:t>9/4/2013</a:t>
             </a:fld>
             <a:endParaRPr lang="en-US"/>
           </a:p>
@@ -2586,7 +2586,7 @@
     </p:spTree>
     <p:extLst>
       <p:ext uri="{BB962C8B-B14F-4D97-AF65-F5344CB8AC3E}">
-        <p14:creationId xmlns="" xmlns:p14="http://schemas.microsoft.com/office/powerpoint/2010/main" val="2463597135"/>
+        <p14:creationId xmlns:p14="http://schemas.microsoft.com/office/powerpoint/2010/main" xmlns="" val="2463597135"/>
       </p:ext>
     </p:extLst>
   </p:cSld>
@@ -2749,7 +2749,7 @@
             <a:fld id="{AA29F937-ACB6-334F-A184-2C64CD75571A}" type="datetimeFigureOut">
               <a:rPr lang="en-US" smtClean="0"/>
               <a:pPr/>
-              <a:t>9/2/2013</a:t>
+              <a:t>9/4/2013</a:t>
             </a:fld>
             <a:endParaRPr lang="en-US"/>
           </a:p>
@@ -2837,7 +2837,7 @@
     </p:spTree>
     <p:extLst>
       <p:ext uri="{BB962C8B-B14F-4D97-AF65-F5344CB8AC3E}">
-        <p14:creationId xmlns="" xmlns:p14="http://schemas.microsoft.com/office/powerpoint/2010/main" val="92069919"/>
+        <p14:creationId xmlns:p14="http://schemas.microsoft.com/office/powerpoint/2010/main" xmlns="" val="92069919"/>
       </p:ext>
     </p:extLst>
   </p:cSld>
@@ -3170,28 +3170,8 @@
           </a:p>
           <a:p>
             <a:r>
-              <a:rPr lang="en-US" dirty="0" smtClean="0"/>
-              <a:t>https://</a:t>
-            </a:r>
-            <a:r>
-              <a:rPr lang="en-US" dirty="0" err="1" smtClean="0"/>
-              <a:t>github.com</a:t>
-            </a:r>
-            <a:r>
-              <a:rPr lang="en-US" dirty="0" smtClean="0"/>
-              <a:t>/</a:t>
-            </a:r>
-            <a:r>
-              <a:rPr lang="en-US" dirty="0" err="1" smtClean="0"/>
-              <a:t>fishjord</a:t>
-            </a:r>
-            <a:r>
-              <a:rPr lang="en-US" dirty="0" smtClean="0"/>
-              <a:t>/</a:t>
-            </a:r>
-            <a:r>
-              <a:rPr lang="en-US" dirty="0" err="1" smtClean="0"/>
-              <a:t>lightning_make_tutorial</a:t>
+              <a:rPr lang="en-US" smtClean="0"/>
+              <a:t>https://github.com/fishjord/make_swc_quickstart</a:t>
             </a:r>
             <a:endParaRPr lang="en-US" dirty="0"/>
           </a:p>
@@ -3200,7 +3180,7 @@
     </p:spTree>
     <p:extLst>
       <p:ext uri="{BB962C8B-B14F-4D97-AF65-F5344CB8AC3E}">
-        <p14:creationId xmlns="" xmlns:p14="http://schemas.microsoft.com/office/powerpoint/2010/main" val="1084336545"/>
+        <p14:creationId xmlns:p14="http://schemas.microsoft.com/office/powerpoint/2010/main" xmlns="" val="1084336545"/>
       </p:ext>
     </p:extLst>
   </p:cSld>
@@ -3322,7 +3302,7 @@
     </p:spTree>
     <p:extLst>
       <p:ext uri="{BB962C8B-B14F-4D97-AF65-F5344CB8AC3E}">
-        <p14:creationId xmlns="" xmlns:p14="http://schemas.microsoft.com/office/powerpoint/2010/main" val="3683493359"/>
+        <p14:creationId xmlns:p14="http://schemas.microsoft.com/office/powerpoint/2010/main" xmlns="" val="3683493359"/>
       </p:ext>
     </p:extLst>
   </p:cSld>
@@ -3450,7 +3430,7 @@
     </p:spTree>
     <p:extLst>
       <p:ext uri="{BB962C8B-B14F-4D97-AF65-F5344CB8AC3E}">
-        <p14:creationId xmlns="" xmlns:p14="http://schemas.microsoft.com/office/powerpoint/2010/main" val="491944262"/>
+        <p14:creationId xmlns:p14="http://schemas.microsoft.com/office/powerpoint/2010/main" xmlns="" val="491944262"/>
       </p:ext>
     </p:extLst>
   </p:cSld>
@@ -3964,7 +3944,7 @@
     </p:spTree>
     <p:extLst>
       <p:ext uri="{BB962C8B-B14F-4D97-AF65-F5344CB8AC3E}">
-        <p14:creationId xmlns="" xmlns:p14="http://schemas.microsoft.com/office/powerpoint/2010/main" val="2609321141"/>
+        <p14:creationId xmlns:p14="http://schemas.microsoft.com/office/powerpoint/2010/main" xmlns="" val="2609321141"/>
       </p:ext>
     </p:extLst>
   </p:cSld>
@@ -4085,7 +4065,7 @@
     </p:spTree>
     <p:extLst>
       <p:ext uri="{BB962C8B-B14F-4D97-AF65-F5344CB8AC3E}">
-        <p14:creationId xmlns="" xmlns:p14="http://schemas.microsoft.com/office/powerpoint/2010/main" val="971951723"/>
+        <p14:creationId xmlns:p14="http://schemas.microsoft.com/office/powerpoint/2010/main" xmlns="" val="971951723"/>
       </p:ext>
     </p:extLst>
   </p:cSld>
@@ -4204,7 +4184,7 @@
     </p:spTree>
     <p:extLst>
       <p:ext uri="{BB962C8B-B14F-4D97-AF65-F5344CB8AC3E}">
-        <p14:creationId xmlns="" xmlns:p14="http://schemas.microsoft.com/office/powerpoint/2010/main" val="4193112732"/>
+        <p14:creationId xmlns:p14="http://schemas.microsoft.com/office/powerpoint/2010/main" xmlns="" val="4193112732"/>
       </p:ext>
     </p:extLst>
   </p:cSld>
@@ -4257,7 +4237,7 @@
     </p:spTree>
     <p:extLst>
       <p:ext uri="{BB962C8B-B14F-4D97-AF65-F5344CB8AC3E}">
-        <p14:creationId xmlns="" xmlns:p14="http://schemas.microsoft.com/office/powerpoint/2010/main" val="1551060267"/>
+        <p14:creationId xmlns:p14="http://schemas.microsoft.com/office/powerpoint/2010/main" xmlns="" val="1551060267"/>
       </p:ext>
     </p:extLst>
   </p:cSld>

</xml_diff>